<commit_message>
Modify Lab01 and some notebooks in linear regression and k-NN
</commit_message>
<xml_diff>
--- a/02_Linear_regression/Lab00_Introduction_to_scikit-learn.pptx
+++ b/02_Linear_regression/Lab00_Introduction_to_scikit-learn.pptx
@@ -222,7 +222,7 @@
           <a:p>
             <a:fld id="{5133A210-11CB-4406-AD69-106C78B08EF4}" type="datetimeFigureOut">
               <a:rPr lang="ko-KR" altLang="en-US" smtClean="0"/>
-              <a:t>2017-06-24</a:t>
+              <a:t>2017. 7. 10.</a:t>
             </a:fld>
             <a:endParaRPr lang="ko-KR" altLang="en-US"/>
           </a:p>
@@ -387,7 +387,7 @@
           <a:p>
             <a:fld id="{990FF436-EE12-497A-A228-2A8D3D8D5F8A}" type="datetimeFigureOut">
               <a:rPr lang="ko-KR" altLang="en-US" smtClean="0"/>
-              <a:t>2017-06-24</a:t>
+              <a:t>2017. 7. 10.</a:t>
             </a:fld>
             <a:endParaRPr lang="ko-KR" altLang="en-US"/>
           </a:p>
@@ -3943,17 +3943,6 @@
           <a:lstStyle/>
           <a:p>
             <a:r>
-              <a:rPr lang="ko-KR" altLang="en-US" sz="2000" dirty="0">
-                <a:solidFill>
-                  <a:schemeClr val="tx1">
-                    <a:lumMod val="50000"/>
-                    <a:lumOff val="50000"/>
-                  </a:schemeClr>
-                </a:solidFill>
-              </a:rPr>
-              <a:t>고태훈 </a:t>
-            </a:r>
-            <a:r>
               <a:rPr lang="en-US" altLang="ko-KR" sz="2000" dirty="0">
                 <a:solidFill>
                   <a:schemeClr val="tx1">
@@ -3962,7 +3951,29 @@
                   </a:schemeClr>
                 </a:solidFill>
               </a:rPr>
-              <a:t>(thoon.koh@gmail.com)</a:t>
+              <a:t>Taehoon Ko (</a:t>
+            </a:r>
+            <a:r>
+              <a:rPr lang="en-US" altLang="ko-KR" sz="2000" dirty="0" err="1">
+                <a:solidFill>
+                  <a:schemeClr val="tx1">
+                    <a:lumMod val="50000"/>
+                    <a:lumOff val="50000"/>
+                  </a:schemeClr>
+                </a:solidFill>
+              </a:rPr>
+              <a:t>thoon.koh@gmail.com</a:t>
+            </a:r>
+            <a:r>
+              <a:rPr lang="en-US" altLang="ko-KR" sz="2000">
+                <a:solidFill>
+                  <a:schemeClr val="tx1">
+                    <a:lumMod val="50000"/>
+                    <a:lumOff val="50000"/>
+                  </a:schemeClr>
+                </a:solidFill>
+              </a:rPr>
+              <a:t>)</a:t>
             </a:r>
             <a:endParaRPr lang="ko-KR" altLang="en-US" sz="2000" dirty="0">
               <a:solidFill>
@@ -4033,7 +4044,7 @@
           <p:cNvPr id="2" name="제목 1">
             <a:extLst>
               <a:ext uri="{FF2B5EF4-FFF2-40B4-BE49-F238E27FC236}">
-                <a16:creationId xmlns:a16="http://schemas.microsoft.com/office/drawing/2014/main" id="{E8A7292B-2277-48BD-8A67-EB238E1707B9}"/>
+                <a16:creationId xmlns:a16="http://schemas.microsoft.com/office/drawing/2014/main" xmlns="" id="{E8A7292B-2277-48BD-8A67-EB238E1707B9}"/>
               </a:ext>
             </a:extLst>
           </p:cNvPr>
@@ -4066,7 +4077,7 @@
           <p:cNvPr id="3" name="내용 개체 틀 2">
             <a:extLst>
               <a:ext uri="{FF2B5EF4-FFF2-40B4-BE49-F238E27FC236}">
-                <a16:creationId xmlns:a16="http://schemas.microsoft.com/office/drawing/2014/main" id="{339FFDD0-1599-4C5D-8332-234ECD9CC9C1}"/>
+                <a16:creationId xmlns:a16="http://schemas.microsoft.com/office/drawing/2014/main" xmlns="" id="{339FFDD0-1599-4C5D-8332-234ECD9CC9C1}"/>
               </a:ext>
             </a:extLst>
           </p:cNvPr>
@@ -4109,6 +4120,10 @@
             <a:r>
               <a:rPr lang="en-US" altLang="ko-KR" dirty="0" err="1"/>
               <a:t>StandardScaler</a:t>
+            </a:r>
+            <a:r>
+              <a:rPr lang="en-US" altLang="ko-KR" dirty="0"/>
+              <a:t/>
             </a:r>
             <a:br>
               <a:rPr lang="en-US" altLang="ko-KR" dirty="0"/>
@@ -4201,6 +4216,10 @@
               <a:rPr lang="en-US" altLang="ko-KR" dirty="0" err="1"/>
               <a:t>LinearRegression</a:t>
             </a:r>
+            <a:r>
+              <a:rPr lang="en-US" altLang="ko-KR" dirty="0"/>
+              <a:t/>
+            </a:r>
             <a:br>
               <a:rPr lang="en-US" altLang="ko-KR" dirty="0"/>
             </a:br>
@@ -4282,7 +4301,7 @@
           <p:cNvPr id="4" name="슬라이드 번호 개체 틀 3">
             <a:extLst>
               <a:ext uri="{FF2B5EF4-FFF2-40B4-BE49-F238E27FC236}">
-                <a16:creationId xmlns:a16="http://schemas.microsoft.com/office/drawing/2014/main" id="{54B9B4E5-BF2A-4132-9441-E0EF8FDDFD96}"/>
+                <a16:creationId xmlns:a16="http://schemas.microsoft.com/office/drawing/2014/main" xmlns="" id="{54B9B4E5-BF2A-4132-9441-E0EF8FDDFD96}"/>
               </a:ext>
             </a:extLst>
           </p:cNvPr>
@@ -4311,7 +4330,7 @@
           <p:cNvPr id="6" name="TextBox 5">
             <a:extLst>
               <a:ext uri="{FF2B5EF4-FFF2-40B4-BE49-F238E27FC236}">
-                <a16:creationId xmlns:a16="http://schemas.microsoft.com/office/drawing/2014/main" id="{D304989E-1F2D-4B92-9FE3-79402F107BB8}"/>
+                <a16:creationId xmlns:a16="http://schemas.microsoft.com/office/drawing/2014/main" xmlns="" id="{D304989E-1F2D-4B92-9FE3-79402F107BB8}"/>
               </a:ext>
             </a:extLst>
           </p:cNvPr>
@@ -4369,7 +4388,7 @@
           <p:cNvPr id="12" name="TextBox 11">
             <a:extLst>
               <a:ext uri="{FF2B5EF4-FFF2-40B4-BE49-F238E27FC236}">
-                <a16:creationId xmlns:a16="http://schemas.microsoft.com/office/drawing/2014/main" id="{FD4485B1-C432-40E4-BCB4-E5C3E27F3F3D}"/>
+                <a16:creationId xmlns:a16="http://schemas.microsoft.com/office/drawing/2014/main" xmlns="" id="{FD4485B1-C432-40E4-BCB4-E5C3E27F3F3D}"/>
               </a:ext>
             </a:extLst>
           </p:cNvPr>
@@ -4457,7 +4476,7 @@
           <p:cNvPr id="2" name="제목 1">
             <a:extLst>
               <a:ext uri="{FF2B5EF4-FFF2-40B4-BE49-F238E27FC236}">
-                <a16:creationId xmlns:a16="http://schemas.microsoft.com/office/drawing/2014/main" id="{56628E55-78FD-4D60-8F53-DFAAC4DE2C3B}"/>
+                <a16:creationId xmlns:a16="http://schemas.microsoft.com/office/drawing/2014/main" xmlns="" id="{56628E55-78FD-4D60-8F53-DFAAC4DE2C3B}"/>
               </a:ext>
             </a:extLst>
           </p:cNvPr>
@@ -4490,7 +4509,7 @@
           <p:cNvPr id="3" name="내용 개체 틀 2">
             <a:extLst>
               <a:ext uri="{FF2B5EF4-FFF2-40B4-BE49-F238E27FC236}">
-                <a16:creationId xmlns:a16="http://schemas.microsoft.com/office/drawing/2014/main" id="{0452FF66-AADD-4AF0-A180-A00221F05218}"/>
+                <a16:creationId xmlns:a16="http://schemas.microsoft.com/office/drawing/2014/main" xmlns="" id="{0452FF66-AADD-4AF0-A180-A00221F05218}"/>
               </a:ext>
             </a:extLst>
           </p:cNvPr>
@@ -4529,7 +4548,7 @@
           <p:cNvPr id="4" name="슬라이드 번호 개체 틀 3">
             <a:extLst>
               <a:ext uri="{FF2B5EF4-FFF2-40B4-BE49-F238E27FC236}">
-                <a16:creationId xmlns:a16="http://schemas.microsoft.com/office/drawing/2014/main" id="{F3333725-0A99-4954-A986-D8BF9DFB69F0}"/>
+                <a16:creationId xmlns:a16="http://schemas.microsoft.com/office/drawing/2014/main" xmlns="" id="{F3333725-0A99-4954-A986-D8BF9DFB69F0}"/>
               </a:ext>
             </a:extLst>
           </p:cNvPr>
@@ -4558,7 +4577,7 @@
           <p:cNvPr id="9" name="원통형 8">
             <a:extLst>
               <a:ext uri="{FF2B5EF4-FFF2-40B4-BE49-F238E27FC236}">
-                <a16:creationId xmlns:a16="http://schemas.microsoft.com/office/drawing/2014/main" id="{FAA3EF87-D69C-4AA3-B212-646545ED4C6E}"/>
+                <a16:creationId xmlns:a16="http://schemas.microsoft.com/office/drawing/2014/main" xmlns="" id="{FAA3EF87-D69C-4AA3-B212-646545ED4C6E}"/>
               </a:ext>
             </a:extLst>
           </p:cNvPr>
@@ -4606,7 +4625,7 @@
           <p:cNvPr id="10" name="직선 화살표 연결선 9">
             <a:extLst>
               <a:ext uri="{FF2B5EF4-FFF2-40B4-BE49-F238E27FC236}">
-                <a16:creationId xmlns:a16="http://schemas.microsoft.com/office/drawing/2014/main" id="{586D9698-00E0-4568-A574-3DA4026A8C8E}"/>
+                <a16:creationId xmlns:a16="http://schemas.microsoft.com/office/drawing/2014/main" xmlns="" id="{586D9698-00E0-4568-A574-3DA4026A8C8E}"/>
               </a:ext>
             </a:extLst>
           </p:cNvPr>
@@ -4651,7 +4670,7 @@
           <p:cNvPr id="11" name="직사각형 10">
             <a:extLst>
               <a:ext uri="{FF2B5EF4-FFF2-40B4-BE49-F238E27FC236}">
-                <a16:creationId xmlns:a16="http://schemas.microsoft.com/office/drawing/2014/main" id="{5D555799-0175-4BE4-90FC-60EBFD4FCDC1}"/>
+                <a16:creationId xmlns:a16="http://schemas.microsoft.com/office/drawing/2014/main" xmlns="" id="{5D555799-0175-4BE4-90FC-60EBFD4FCDC1}"/>
               </a:ext>
             </a:extLst>
           </p:cNvPr>
@@ -4714,7 +4733,7 @@
           <p:cNvPr id="12" name="직선 화살표 연결선 11">
             <a:extLst>
               <a:ext uri="{FF2B5EF4-FFF2-40B4-BE49-F238E27FC236}">
-                <a16:creationId xmlns:a16="http://schemas.microsoft.com/office/drawing/2014/main" id="{8A297464-A0D7-4060-A275-950676E8A46E}"/>
+                <a16:creationId xmlns:a16="http://schemas.microsoft.com/office/drawing/2014/main" xmlns="" id="{8A297464-A0D7-4060-A275-950676E8A46E}"/>
               </a:ext>
             </a:extLst>
           </p:cNvPr>
@@ -4758,7 +4777,7 @@
           <p:cNvPr id="13" name="원통형 12">
             <a:extLst>
               <a:ext uri="{FF2B5EF4-FFF2-40B4-BE49-F238E27FC236}">
-                <a16:creationId xmlns:a16="http://schemas.microsoft.com/office/drawing/2014/main" id="{B52C944E-5959-479A-B915-70E16895B92F}"/>
+                <a16:creationId xmlns:a16="http://schemas.microsoft.com/office/drawing/2014/main" xmlns="" id="{B52C944E-5959-479A-B915-70E16895B92F}"/>
               </a:ext>
             </a:extLst>
           </p:cNvPr>
@@ -4851,7 +4870,7 @@
           <p:cNvPr id="2" name="제목 1">
             <a:extLst>
               <a:ext uri="{FF2B5EF4-FFF2-40B4-BE49-F238E27FC236}">
-                <a16:creationId xmlns:a16="http://schemas.microsoft.com/office/drawing/2014/main" id="{56628E55-78FD-4D60-8F53-DFAAC4DE2C3B}"/>
+                <a16:creationId xmlns:a16="http://schemas.microsoft.com/office/drawing/2014/main" xmlns="" id="{56628E55-78FD-4D60-8F53-DFAAC4DE2C3B}"/>
               </a:ext>
             </a:extLst>
           </p:cNvPr>
@@ -4884,7 +4903,7 @@
           <p:cNvPr id="3" name="내용 개체 틀 2">
             <a:extLst>
               <a:ext uri="{FF2B5EF4-FFF2-40B4-BE49-F238E27FC236}">
-                <a16:creationId xmlns:a16="http://schemas.microsoft.com/office/drawing/2014/main" id="{0452FF66-AADD-4AF0-A180-A00221F05218}"/>
+                <a16:creationId xmlns:a16="http://schemas.microsoft.com/office/drawing/2014/main" xmlns="" id="{0452FF66-AADD-4AF0-A180-A00221F05218}"/>
               </a:ext>
             </a:extLst>
           </p:cNvPr>
@@ -4917,7 +4936,7 @@
           <p:cNvPr id="4" name="슬라이드 번호 개체 틀 3">
             <a:extLst>
               <a:ext uri="{FF2B5EF4-FFF2-40B4-BE49-F238E27FC236}">
-                <a16:creationId xmlns:a16="http://schemas.microsoft.com/office/drawing/2014/main" id="{F3333725-0A99-4954-A986-D8BF9DFB69F0}"/>
+                <a16:creationId xmlns:a16="http://schemas.microsoft.com/office/drawing/2014/main" xmlns="" id="{F3333725-0A99-4954-A986-D8BF9DFB69F0}"/>
               </a:ext>
             </a:extLst>
           </p:cNvPr>
@@ -4946,7 +4965,7 @@
           <p:cNvPr id="6" name="그림 5">
             <a:extLst>
               <a:ext uri="{FF2B5EF4-FFF2-40B4-BE49-F238E27FC236}">
-                <a16:creationId xmlns:a16="http://schemas.microsoft.com/office/drawing/2014/main" id="{46DC64AA-1185-4271-8A8E-5549012EB138}"/>
+                <a16:creationId xmlns:a16="http://schemas.microsoft.com/office/drawing/2014/main" xmlns="" id="{46DC64AA-1185-4271-8A8E-5549012EB138}"/>
               </a:ext>
             </a:extLst>
           </p:cNvPr>
@@ -4976,7 +4995,7 @@
           <p:cNvPr id="7" name="그림 6">
             <a:extLst>
               <a:ext uri="{FF2B5EF4-FFF2-40B4-BE49-F238E27FC236}">
-                <a16:creationId xmlns:a16="http://schemas.microsoft.com/office/drawing/2014/main" id="{A14D8338-0E01-4B00-9339-A697DF213BDF}"/>
+                <a16:creationId xmlns:a16="http://schemas.microsoft.com/office/drawing/2014/main" xmlns="" id="{A14D8338-0E01-4B00-9339-A697DF213BDF}"/>
               </a:ext>
             </a:extLst>
           </p:cNvPr>
@@ -5006,7 +5025,7 @@
           <p:cNvPr id="15" name="직사각형 14">
             <a:extLst>
               <a:ext uri="{FF2B5EF4-FFF2-40B4-BE49-F238E27FC236}">
-                <a16:creationId xmlns:a16="http://schemas.microsoft.com/office/drawing/2014/main" id="{B1EA1BF4-1131-4594-8BED-745E10896B1D}"/>
+                <a16:creationId xmlns:a16="http://schemas.microsoft.com/office/drawing/2014/main" xmlns="" id="{B1EA1BF4-1131-4594-8BED-745E10896B1D}"/>
               </a:ext>
             </a:extLst>
           </p:cNvPr>
@@ -5058,7 +5077,7 @@
           <p:cNvPr id="16" name="TextBox 15">
             <a:extLst>
               <a:ext uri="{FF2B5EF4-FFF2-40B4-BE49-F238E27FC236}">
-                <a16:creationId xmlns:a16="http://schemas.microsoft.com/office/drawing/2014/main" id="{357FD343-FC53-493C-B938-AA150D95CF21}"/>
+                <a16:creationId xmlns:a16="http://schemas.microsoft.com/office/drawing/2014/main" xmlns="" id="{357FD343-FC53-493C-B938-AA150D95CF21}"/>
               </a:ext>
             </a:extLst>
           </p:cNvPr>
@@ -5161,7 +5180,7 @@
           <p:cNvPr id="17" name="TextBox 16">
             <a:extLst>
               <a:ext uri="{FF2B5EF4-FFF2-40B4-BE49-F238E27FC236}">
-                <a16:creationId xmlns:a16="http://schemas.microsoft.com/office/drawing/2014/main" id="{1AFD1FAF-5846-48D7-8896-34D40E2D1A78}"/>
+                <a16:creationId xmlns:a16="http://schemas.microsoft.com/office/drawing/2014/main" xmlns="" id="{1AFD1FAF-5846-48D7-8896-34D40E2D1A78}"/>
               </a:ext>
             </a:extLst>
           </p:cNvPr>
@@ -5197,7 +5216,7 @@
           <p:cNvPr id="19" name="직선 화살표 연결선 18">
             <a:extLst>
               <a:ext uri="{FF2B5EF4-FFF2-40B4-BE49-F238E27FC236}">
-                <a16:creationId xmlns:a16="http://schemas.microsoft.com/office/drawing/2014/main" id="{17A8C6C2-ABD4-4679-99EC-58438A79F1AA}"/>
+                <a16:creationId xmlns:a16="http://schemas.microsoft.com/office/drawing/2014/main" xmlns="" id="{17A8C6C2-ABD4-4679-99EC-58438A79F1AA}"/>
               </a:ext>
             </a:extLst>
           </p:cNvPr>
@@ -5271,7 +5290,7 @@
           <p:cNvPr id="2" name="제목 1">
             <a:extLst>
               <a:ext uri="{FF2B5EF4-FFF2-40B4-BE49-F238E27FC236}">
-                <a16:creationId xmlns:a16="http://schemas.microsoft.com/office/drawing/2014/main" id="{56628E55-78FD-4D60-8F53-DFAAC4DE2C3B}"/>
+                <a16:creationId xmlns:a16="http://schemas.microsoft.com/office/drawing/2014/main" xmlns="" id="{56628E55-78FD-4D60-8F53-DFAAC4DE2C3B}"/>
               </a:ext>
             </a:extLst>
           </p:cNvPr>
@@ -5304,7 +5323,7 @@
           <p:cNvPr id="3" name="내용 개체 틀 2">
             <a:extLst>
               <a:ext uri="{FF2B5EF4-FFF2-40B4-BE49-F238E27FC236}">
-                <a16:creationId xmlns:a16="http://schemas.microsoft.com/office/drawing/2014/main" id="{0452FF66-AADD-4AF0-A180-A00221F05218}"/>
+                <a16:creationId xmlns:a16="http://schemas.microsoft.com/office/drawing/2014/main" xmlns="" id="{0452FF66-AADD-4AF0-A180-A00221F05218}"/>
               </a:ext>
             </a:extLst>
           </p:cNvPr>
@@ -5337,7 +5356,7 @@
           <p:cNvPr id="4" name="슬라이드 번호 개체 틀 3">
             <a:extLst>
               <a:ext uri="{FF2B5EF4-FFF2-40B4-BE49-F238E27FC236}">
-                <a16:creationId xmlns:a16="http://schemas.microsoft.com/office/drawing/2014/main" id="{F3333725-0A99-4954-A986-D8BF9DFB69F0}"/>
+                <a16:creationId xmlns:a16="http://schemas.microsoft.com/office/drawing/2014/main" xmlns="" id="{F3333725-0A99-4954-A986-D8BF9DFB69F0}"/>
               </a:ext>
             </a:extLst>
           </p:cNvPr>
@@ -5366,7 +5385,7 @@
           <p:cNvPr id="8" name="그림 7">
             <a:extLst>
               <a:ext uri="{FF2B5EF4-FFF2-40B4-BE49-F238E27FC236}">
-                <a16:creationId xmlns:a16="http://schemas.microsoft.com/office/drawing/2014/main" id="{3147EB63-DD37-442C-994F-32704ECA3DD9}"/>
+                <a16:creationId xmlns:a16="http://schemas.microsoft.com/office/drawing/2014/main" xmlns="" id="{3147EB63-DD37-442C-994F-32704ECA3DD9}"/>
               </a:ext>
             </a:extLst>
           </p:cNvPr>
@@ -5396,7 +5415,7 @@
           <p:cNvPr id="5" name="화살표: 왼쪽으로 구부러짐 4">
             <a:extLst>
               <a:ext uri="{FF2B5EF4-FFF2-40B4-BE49-F238E27FC236}">
-                <a16:creationId xmlns:a16="http://schemas.microsoft.com/office/drawing/2014/main" id="{7056BFD6-2972-4519-AADF-BCBA2773345E}"/>
+                <a16:creationId xmlns:a16="http://schemas.microsoft.com/office/drawing/2014/main" xmlns="" id="{7056BFD6-2972-4519-AADF-BCBA2773345E}"/>
               </a:ext>
             </a:extLst>
           </p:cNvPr>
@@ -5444,7 +5463,7 @@
           <p:cNvPr id="9" name="TextBox 8">
             <a:extLst>
               <a:ext uri="{FF2B5EF4-FFF2-40B4-BE49-F238E27FC236}">
-                <a16:creationId xmlns:a16="http://schemas.microsoft.com/office/drawing/2014/main" id="{29437BD4-3170-4BA5-A3D9-08A5F175D9C1}"/>
+                <a16:creationId xmlns:a16="http://schemas.microsoft.com/office/drawing/2014/main" xmlns="" id="{29437BD4-3170-4BA5-A3D9-08A5F175D9C1}"/>
               </a:ext>
             </a:extLst>
           </p:cNvPr>
@@ -5510,7 +5529,7 @@
           <p:cNvPr id="2" name="제목 1">
             <a:extLst>
               <a:ext uri="{FF2B5EF4-FFF2-40B4-BE49-F238E27FC236}">
-                <a16:creationId xmlns:a16="http://schemas.microsoft.com/office/drawing/2014/main" id="{E3EBA3CE-3FA2-4F7B-9925-BB2D3B56CF1E}"/>
+                <a16:creationId xmlns:a16="http://schemas.microsoft.com/office/drawing/2014/main" xmlns="" id="{E3EBA3CE-3FA2-4F7B-9925-BB2D3B56CF1E}"/>
               </a:ext>
             </a:extLst>
           </p:cNvPr>
@@ -5538,14 +5557,14 @@
           </a:p>
         </p:txBody>
       </p:sp>
-      <mc:AlternateContent xmlns:mc="http://schemas.openxmlformats.org/markup-compatibility/2006">
-        <mc:Choice xmlns:a14="http://schemas.microsoft.com/office/drawing/2010/main" Requires="a14">
+      <mc:AlternateContent xmlns:mc="http://schemas.openxmlformats.org/markup-compatibility/2006" xmlns:a14="http://schemas.microsoft.com/office/drawing/2010/main">
+        <mc:Choice Requires="a14">
           <p:sp>
             <p:nvSpPr>
               <p:cNvPr id="3" name="내용 개체 틀 2">
                 <a:extLst>
                   <a:ext uri="{FF2B5EF4-FFF2-40B4-BE49-F238E27FC236}">
-                    <a16:creationId xmlns:a16="http://schemas.microsoft.com/office/drawing/2014/main" id="{6EE05EEE-CAB4-4D0D-B097-BFAB55AEEA25}"/>
+                    <a16:creationId xmlns:a16="http://schemas.microsoft.com/office/drawing/2014/main" xmlns="" id="{6EE05EEE-CAB4-4D0D-B097-BFAB55AEEA25}"/>
                   </a:ext>
                 </a:extLst>
               </p:cNvPr>
@@ -5585,7 +5604,7 @@
                       <m:sSubPr>
                         <m:ctrlPr>
                           <a:rPr lang="en-US" altLang="ko-KR" b="0" i="1" smtClean="0">
-                            <a:latin typeface="Cambria Math" panose="02040503050406030204" pitchFamily="18" charset="0"/>
+                            <a:latin typeface="Cambria Math" charset="0"/>
                           </a:rPr>
                         </m:ctrlPr>
                       </m:sSubPr>
@@ -5616,7 +5635,7 @@
                       <m:sSubPr>
                         <m:ctrlPr>
                           <a:rPr lang="en-US" altLang="ko-KR" b="0" i="1" smtClean="0">
-                            <a:latin typeface="Cambria Math" panose="02040503050406030204" pitchFamily="18" charset="0"/>
+                            <a:latin typeface="Cambria Math" charset="0"/>
                           </a:rPr>
                         </m:ctrlPr>
                       </m:sSubPr>
@@ -5647,7 +5666,7 @@
                       <m:sSubPr>
                         <m:ctrlPr>
                           <a:rPr lang="en-US" altLang="ko-KR" b="0" i="1" smtClean="0">
-                            <a:latin typeface="Cambria Math" panose="02040503050406030204" pitchFamily="18" charset="0"/>
+                            <a:latin typeface="Cambria Math" charset="0"/>
                           </a:rPr>
                         </m:ctrlPr>
                       </m:sSubPr>
@@ -5685,7 +5704,7 @@
                         <m:chr m:val="̂"/>
                         <m:ctrlPr>
                           <a:rPr lang="en-US" altLang="ko-KR" b="0" i="1" smtClean="0">
-                            <a:latin typeface="Cambria Math" panose="02040503050406030204" pitchFamily="18" charset="0"/>
+                            <a:latin typeface="Cambria Math" charset="0"/>
                           </a:rPr>
                         </m:ctrlPr>
                       </m:accPr>
@@ -5715,7 +5734,7 @@
             </p:txBody>
           </p:sp>
         </mc:Choice>
-        <mc:Fallback>
+        <mc:Fallback xmlns="">
           <p:sp>
             <p:nvSpPr>
               <p:cNvPr id="3" name="내용 개체 틀 2">
@@ -5760,7 +5779,7 @@
           <p:cNvPr id="4" name="슬라이드 번호 개체 틀 3">
             <a:extLst>
               <a:ext uri="{FF2B5EF4-FFF2-40B4-BE49-F238E27FC236}">
-                <a16:creationId xmlns:a16="http://schemas.microsoft.com/office/drawing/2014/main" id="{D3BE1DB5-2E6E-4287-AA70-FBF0E638C7C3}"/>
+                <a16:creationId xmlns:a16="http://schemas.microsoft.com/office/drawing/2014/main" xmlns="" id="{D3BE1DB5-2E6E-4287-AA70-FBF0E638C7C3}"/>
               </a:ext>
             </a:extLst>
           </p:cNvPr>
@@ -5784,14 +5803,14 @@
           </a:p>
         </p:txBody>
       </p:sp>
-      <mc:AlternateContent xmlns:mc="http://schemas.openxmlformats.org/markup-compatibility/2006">
-        <mc:Choice xmlns:a14="http://schemas.microsoft.com/office/drawing/2010/main" Requires="a14">
+      <mc:AlternateContent xmlns:mc="http://schemas.openxmlformats.org/markup-compatibility/2006" xmlns:a14="http://schemas.microsoft.com/office/drawing/2010/main">
+        <mc:Choice Requires="a14">
           <p:sp>
             <p:nvSpPr>
               <p:cNvPr id="5" name="원통형 4">
                 <a:extLst>
                   <a:ext uri="{FF2B5EF4-FFF2-40B4-BE49-F238E27FC236}">
-                    <a16:creationId xmlns:a16="http://schemas.microsoft.com/office/drawing/2014/main" id="{DE4001C3-B019-43A5-B68B-93A237FF514B}"/>
+                    <a16:creationId xmlns:a16="http://schemas.microsoft.com/office/drawing/2014/main" xmlns="" id="{DE4001C3-B019-43A5-B68B-93A237FF514B}"/>
                   </a:ext>
                 </a:extLst>
               </p:cNvPr>
@@ -5836,7 +5855,7 @@
                       <m:sSubPr>
                         <m:ctrlPr>
                           <a:rPr lang="en-US" altLang="ko-KR" sz="2800" i="1">
-                            <a:latin typeface="Cambria Math" panose="02040503050406030204" pitchFamily="18" charset="0"/>
+                            <a:latin typeface="Cambria Math" charset="0"/>
                           </a:rPr>
                         </m:ctrlPr>
                       </m:sSubPr>
@@ -5879,7 +5898,7 @@
                       <m:sSubPr>
                         <m:ctrlPr>
                           <a:rPr lang="en-US" altLang="ko-KR" sz="2800" i="1">
-                            <a:latin typeface="Cambria Math" panose="02040503050406030204" pitchFamily="18" charset="0"/>
+                            <a:latin typeface="Cambria Math" charset="0"/>
                           </a:rPr>
                         </m:ctrlPr>
                       </m:sSubPr>
@@ -5911,7 +5930,7 @@
             </p:txBody>
           </p:sp>
         </mc:Choice>
-        <mc:Fallback>
+        <mc:Fallback xmlns="">
           <p:sp>
             <p:nvSpPr>
               <p:cNvPr id="5" name="원통형 4">
@@ -5961,7 +5980,7 @@
           <p:cNvPr id="6" name="직선 화살표 연결선 5">
             <a:extLst>
               <a:ext uri="{FF2B5EF4-FFF2-40B4-BE49-F238E27FC236}">
-                <a16:creationId xmlns:a16="http://schemas.microsoft.com/office/drawing/2014/main" id="{BCAE69CE-8CA6-4EAB-9C6C-23F2430BA16C}"/>
+                <a16:creationId xmlns:a16="http://schemas.microsoft.com/office/drawing/2014/main" xmlns="" id="{BCAE69CE-8CA6-4EAB-9C6C-23F2430BA16C}"/>
               </a:ext>
             </a:extLst>
           </p:cNvPr>
@@ -6006,7 +6025,7 @@
           <p:cNvPr id="7" name="직사각형 6">
             <a:extLst>
               <a:ext uri="{FF2B5EF4-FFF2-40B4-BE49-F238E27FC236}">
-                <a16:creationId xmlns:a16="http://schemas.microsoft.com/office/drawing/2014/main" id="{151FDD82-0F9E-4E3C-8511-3866B959208A}"/>
+                <a16:creationId xmlns:a16="http://schemas.microsoft.com/office/drawing/2014/main" xmlns="" id="{151FDD82-0F9E-4E3C-8511-3866B959208A}"/>
               </a:ext>
             </a:extLst>
           </p:cNvPr>
@@ -6069,7 +6088,7 @@
           <p:cNvPr id="8" name="직선 화살표 연결선 7">
             <a:extLst>
               <a:ext uri="{FF2B5EF4-FFF2-40B4-BE49-F238E27FC236}">
-                <a16:creationId xmlns:a16="http://schemas.microsoft.com/office/drawing/2014/main" id="{21A8A50B-E21E-428E-B6D6-9B4A41A3EDD6}"/>
+                <a16:creationId xmlns:a16="http://schemas.microsoft.com/office/drawing/2014/main" xmlns="" id="{21A8A50B-E21E-428E-B6D6-9B4A41A3EDD6}"/>
               </a:ext>
             </a:extLst>
           </p:cNvPr>
@@ -6108,14 +6127,14 @@
           </a:fontRef>
         </p:style>
       </p:cxnSp>
-      <mc:AlternateContent xmlns:mc="http://schemas.openxmlformats.org/markup-compatibility/2006">
-        <mc:Choice xmlns:a14="http://schemas.microsoft.com/office/drawing/2010/main" Requires="a14">
+      <mc:AlternateContent xmlns:mc="http://schemas.openxmlformats.org/markup-compatibility/2006" xmlns:a14="http://schemas.microsoft.com/office/drawing/2010/main">
+        <mc:Choice Requires="a14">
           <p:sp>
             <p:nvSpPr>
               <p:cNvPr id="11" name="원통형 10">
                 <a:extLst>
                   <a:ext uri="{FF2B5EF4-FFF2-40B4-BE49-F238E27FC236}">
-                    <a16:creationId xmlns:a16="http://schemas.microsoft.com/office/drawing/2014/main" id="{8CE16360-F061-4EDD-9C6A-19542EF82701}"/>
+                    <a16:creationId xmlns:a16="http://schemas.microsoft.com/office/drawing/2014/main" xmlns="" id="{8CE16360-F061-4EDD-9C6A-19542EF82701}"/>
                   </a:ext>
                 </a:extLst>
               </p:cNvPr>
@@ -6161,7 +6180,7 @@
                           <m:chr m:val="̂"/>
                           <m:ctrlPr>
                             <a:rPr lang="en-US" altLang="ko-KR" sz="2800" i="1">
-                              <a:latin typeface="Cambria Math" panose="02040503050406030204" pitchFamily="18" charset="0"/>
+                              <a:latin typeface="Cambria Math" charset="0"/>
                             </a:rPr>
                           </m:ctrlPr>
                         </m:accPr>
@@ -6182,7 +6201,7 @@
             </p:txBody>
           </p:sp>
         </mc:Choice>
-        <mc:Fallback>
+        <mc:Fallback xmlns="">
           <p:sp>
             <p:nvSpPr>
               <p:cNvPr id="11" name="원통형 10">
@@ -6262,7 +6281,7 @@
           <p:cNvPr id="2" name="제목 1">
             <a:extLst>
               <a:ext uri="{FF2B5EF4-FFF2-40B4-BE49-F238E27FC236}">
-                <a16:creationId xmlns:a16="http://schemas.microsoft.com/office/drawing/2014/main" id="{2003C0AD-FF90-48A0-A954-1FF2068A782A}"/>
+                <a16:creationId xmlns:a16="http://schemas.microsoft.com/office/drawing/2014/main" xmlns="" id="{2003C0AD-FF90-48A0-A954-1FF2068A782A}"/>
               </a:ext>
             </a:extLst>
           </p:cNvPr>
@@ -6295,7 +6314,7 @@
           <p:cNvPr id="3" name="내용 개체 틀 2">
             <a:extLst>
               <a:ext uri="{FF2B5EF4-FFF2-40B4-BE49-F238E27FC236}">
-                <a16:creationId xmlns:a16="http://schemas.microsoft.com/office/drawing/2014/main" id="{26DEEC72-8EDE-478B-AB25-FB5720BF378C}"/>
+                <a16:creationId xmlns:a16="http://schemas.microsoft.com/office/drawing/2014/main" xmlns="" id="{26DEEC72-8EDE-478B-AB25-FB5720BF378C}"/>
               </a:ext>
             </a:extLst>
           </p:cNvPr>
@@ -6322,6 +6341,10 @@
               <a:rPr lang="en-US" altLang="ko-KR" i="1" u="sng" dirty="0"/>
               <a:t>[Training (or fitting) the estimator]</a:t>
             </a:r>
+            <a:r>
+              <a:rPr lang="en-US" altLang="ko-KR" i="1" dirty="0"/>
+              <a:t/>
+            </a:r>
             <a:br>
               <a:rPr lang="en-US" altLang="ko-KR" i="1" dirty="0"/>
             </a:br>
@@ -6340,6 +6363,10 @@
             <a:r>
               <a:rPr lang="en-US" altLang="ko-KR" dirty="0" err="1"/>
               <a:t>LinearRegression</a:t>
+            </a:r>
+            <a:r>
+              <a:rPr lang="en-US" altLang="ko-KR" dirty="0"/>
+              <a:t/>
             </a:r>
             <a:br>
               <a:rPr lang="en-US" altLang="ko-KR" dirty="0"/>
@@ -6399,7 +6426,7 @@
           <p:cNvPr id="4" name="슬라이드 번호 개체 틀 3">
             <a:extLst>
               <a:ext uri="{FF2B5EF4-FFF2-40B4-BE49-F238E27FC236}">
-                <a16:creationId xmlns:a16="http://schemas.microsoft.com/office/drawing/2014/main" id="{B4C9DC4B-A391-4D26-9F5B-386226DDBC63}"/>
+                <a16:creationId xmlns:a16="http://schemas.microsoft.com/office/drawing/2014/main" xmlns="" id="{B4C9DC4B-A391-4D26-9F5B-386226DDBC63}"/>
               </a:ext>
             </a:extLst>
           </p:cNvPr>
@@ -6428,7 +6455,7 @@
           <p:cNvPr id="19" name="그룹 18">
             <a:extLst>
               <a:ext uri="{FF2B5EF4-FFF2-40B4-BE49-F238E27FC236}">
-                <a16:creationId xmlns:a16="http://schemas.microsoft.com/office/drawing/2014/main" id="{0FE6448C-90C7-4DC5-B01E-2418641CAD5E}"/>
+                <a16:creationId xmlns:a16="http://schemas.microsoft.com/office/drawing/2014/main" xmlns="" id="{0FE6448C-90C7-4DC5-B01E-2418641CAD5E}"/>
               </a:ext>
             </a:extLst>
           </p:cNvPr>
@@ -6450,7 +6477,7 @@
             <p:cNvPr id="5" name="직사각형 4">
               <a:extLst>
                 <a:ext uri="{FF2B5EF4-FFF2-40B4-BE49-F238E27FC236}">
-                  <a16:creationId xmlns:a16="http://schemas.microsoft.com/office/drawing/2014/main" id="{FC03CB89-ADF5-487F-BBB0-3B3AEC829605}"/>
+                  <a16:creationId xmlns:a16="http://schemas.microsoft.com/office/drawing/2014/main" xmlns="" id="{FC03CB89-ADF5-487F-BBB0-3B3AEC829605}"/>
                 </a:ext>
               </a:extLst>
             </p:cNvPr>
@@ -6503,7 +6530,7 @@
             <p:cNvPr id="6" name="직사각형 5">
               <a:extLst>
                 <a:ext uri="{FF2B5EF4-FFF2-40B4-BE49-F238E27FC236}">
-                  <a16:creationId xmlns:a16="http://schemas.microsoft.com/office/drawing/2014/main" id="{BFC54E37-0CFC-4ABF-9F72-3F1F4BF8D054}"/>
+                  <a16:creationId xmlns:a16="http://schemas.microsoft.com/office/drawing/2014/main" xmlns="" id="{BFC54E37-0CFC-4ABF-9F72-3F1F4BF8D054}"/>
                 </a:ext>
               </a:extLst>
             </p:cNvPr>
@@ -6556,7 +6583,7 @@
             <p:cNvPr id="7" name="왼쪽 중괄호 6">
               <a:extLst>
                 <a:ext uri="{FF2B5EF4-FFF2-40B4-BE49-F238E27FC236}">
-                  <a16:creationId xmlns:a16="http://schemas.microsoft.com/office/drawing/2014/main" id="{8281E605-58F7-419E-B1D4-84A9C30C9C93}"/>
+                  <a16:creationId xmlns:a16="http://schemas.microsoft.com/office/drawing/2014/main" xmlns="" id="{8281E605-58F7-419E-B1D4-84A9C30C9C93}"/>
                 </a:ext>
               </a:extLst>
             </p:cNvPr>
@@ -6600,7 +6627,7 @@
             <p:cNvPr id="8" name="TextBox 7">
               <a:extLst>
                 <a:ext uri="{FF2B5EF4-FFF2-40B4-BE49-F238E27FC236}">
-                  <a16:creationId xmlns:a16="http://schemas.microsoft.com/office/drawing/2014/main" id="{0A575AAC-35C6-46C6-8CBB-DF415B59E0A5}"/>
+                  <a16:creationId xmlns:a16="http://schemas.microsoft.com/office/drawing/2014/main" xmlns="" id="{0A575AAC-35C6-46C6-8CBB-DF415B59E0A5}"/>
                 </a:ext>
               </a:extLst>
             </p:cNvPr>
@@ -6639,14 +6666,14 @@
             </a:p>
           </p:txBody>
         </p:sp>
-        <mc:AlternateContent xmlns:mc="http://schemas.openxmlformats.org/markup-compatibility/2006">
-          <mc:Choice xmlns:a14="http://schemas.microsoft.com/office/drawing/2010/main" Requires="a14">
+        <mc:AlternateContent xmlns:mc="http://schemas.openxmlformats.org/markup-compatibility/2006" xmlns:a14="http://schemas.microsoft.com/office/drawing/2010/main">
+          <mc:Choice Requires="a14">
             <p:sp>
               <p:nvSpPr>
                 <p:cNvPr id="9" name="직사각형 8">
                   <a:extLst>
                     <a:ext uri="{FF2B5EF4-FFF2-40B4-BE49-F238E27FC236}">
-                      <a16:creationId xmlns:a16="http://schemas.microsoft.com/office/drawing/2014/main" id="{D83E0F1E-6DD3-454E-A51A-67C2D7C7A91D}"/>
+                      <a16:creationId xmlns:a16="http://schemas.microsoft.com/office/drawing/2014/main" xmlns="" id="{D83E0F1E-6DD3-454E-A51A-67C2D7C7A91D}"/>
                     </a:ext>
                   </a:extLst>
                 </p:cNvPr>
@@ -6696,7 +6723,7 @@
                           <m:sSubPr>
                             <m:ctrlPr>
                               <a:rPr lang="en-US" altLang="ko-KR" sz="4000" b="0" i="1" smtClean="0">
-                                <a:latin typeface="Cambria Math" panose="02040503050406030204" pitchFamily="18" charset="0"/>
+                                <a:latin typeface="Cambria Math" charset="0"/>
                               </a:rPr>
                             </m:ctrlPr>
                           </m:sSubPr>
@@ -6725,7 +6752,7 @@
               </p:txBody>
             </p:sp>
           </mc:Choice>
-          <mc:Fallback>
+          <mc:Fallback xmlns="">
             <p:sp>
               <p:nvSpPr>
                 <p:cNvPr id="9" name="직사각형 8">
@@ -6775,7 +6802,7 @@
             <p:cNvPr id="10" name="직사각형 9">
               <a:extLst>
                 <a:ext uri="{FF2B5EF4-FFF2-40B4-BE49-F238E27FC236}">
-                  <a16:creationId xmlns:a16="http://schemas.microsoft.com/office/drawing/2014/main" id="{D4F5130F-2501-437B-81AC-27BF7ECCA473}"/>
+                  <a16:creationId xmlns:a16="http://schemas.microsoft.com/office/drawing/2014/main" xmlns="" id="{D4F5130F-2501-437B-81AC-27BF7ECCA473}"/>
                 </a:ext>
               </a:extLst>
             </p:cNvPr>
@@ -6834,7 +6861,7 @@
             <p:cNvPr id="11" name="왼쪽 중괄호 10">
               <a:extLst>
                 <a:ext uri="{FF2B5EF4-FFF2-40B4-BE49-F238E27FC236}">
-                  <a16:creationId xmlns:a16="http://schemas.microsoft.com/office/drawing/2014/main" id="{7AA986A8-A28F-4A35-8FAD-D44A49A7F0F6}"/>
+                  <a16:creationId xmlns:a16="http://schemas.microsoft.com/office/drawing/2014/main" xmlns="" id="{7AA986A8-A28F-4A35-8FAD-D44A49A7F0F6}"/>
                 </a:ext>
               </a:extLst>
             </p:cNvPr>
@@ -6878,7 +6905,7 @@
             <p:cNvPr id="12" name="TextBox 11">
               <a:extLst>
                 <a:ext uri="{FF2B5EF4-FFF2-40B4-BE49-F238E27FC236}">
-                  <a16:creationId xmlns:a16="http://schemas.microsoft.com/office/drawing/2014/main" id="{F2EF0314-B0A5-402E-8AEE-F620D47CEC5A}"/>
+                  <a16:creationId xmlns:a16="http://schemas.microsoft.com/office/drawing/2014/main" xmlns="" id="{F2EF0314-B0A5-402E-8AEE-F620D47CEC5A}"/>
                 </a:ext>
               </a:extLst>
             </p:cNvPr>
@@ -6922,7 +6949,7 @@
             <p:cNvPr id="13" name="오른쪽 화살표 15">
               <a:extLst>
                 <a:ext uri="{FF2B5EF4-FFF2-40B4-BE49-F238E27FC236}">
-                  <a16:creationId xmlns:a16="http://schemas.microsoft.com/office/drawing/2014/main" id="{ADE16411-A80C-4A5D-A468-16040A729AC2}"/>
+                  <a16:creationId xmlns:a16="http://schemas.microsoft.com/office/drawing/2014/main" xmlns="" id="{ADE16411-A80C-4A5D-A468-16040A729AC2}"/>
                 </a:ext>
               </a:extLst>
             </p:cNvPr>
@@ -6966,7 +6993,7 @@
             <p:cNvPr id="14" name="모서리가 둥근 직사각형 16">
               <a:extLst>
                 <a:ext uri="{FF2B5EF4-FFF2-40B4-BE49-F238E27FC236}">
-                  <a16:creationId xmlns:a16="http://schemas.microsoft.com/office/drawing/2014/main" id="{04C2D636-00BC-42B5-B652-A0EF8675FC3B}"/>
+                  <a16:creationId xmlns:a16="http://schemas.microsoft.com/office/drawing/2014/main" xmlns="" id="{04C2D636-00BC-42B5-B652-A0EF8675FC3B}"/>
                 </a:ext>
               </a:extLst>
             </p:cNvPr>
@@ -7016,7 +7043,7 @@
             <p:cNvPr id="15" name="TextBox 14">
               <a:extLst>
                 <a:ext uri="{FF2B5EF4-FFF2-40B4-BE49-F238E27FC236}">
-                  <a16:creationId xmlns:a16="http://schemas.microsoft.com/office/drawing/2014/main" id="{E9EA95B9-8BB1-4B17-9C34-93D064018FBA}"/>
+                  <a16:creationId xmlns:a16="http://schemas.microsoft.com/office/drawing/2014/main" xmlns="" id="{E9EA95B9-8BB1-4B17-9C34-93D064018FBA}"/>
                 </a:ext>
               </a:extLst>
             </p:cNvPr>
@@ -7091,7 +7118,7 @@
           <p:cNvPr id="2" name="제목 1">
             <a:extLst>
               <a:ext uri="{FF2B5EF4-FFF2-40B4-BE49-F238E27FC236}">
-                <a16:creationId xmlns:a16="http://schemas.microsoft.com/office/drawing/2014/main" id="{2003C0AD-FF90-48A0-A954-1FF2068A782A}"/>
+                <a16:creationId xmlns:a16="http://schemas.microsoft.com/office/drawing/2014/main" xmlns="" id="{2003C0AD-FF90-48A0-A954-1FF2068A782A}"/>
               </a:ext>
             </a:extLst>
           </p:cNvPr>
@@ -7124,7 +7151,7 @@
           <p:cNvPr id="3" name="내용 개체 틀 2">
             <a:extLst>
               <a:ext uri="{FF2B5EF4-FFF2-40B4-BE49-F238E27FC236}">
-                <a16:creationId xmlns:a16="http://schemas.microsoft.com/office/drawing/2014/main" id="{26DEEC72-8EDE-478B-AB25-FB5720BF378C}"/>
+                <a16:creationId xmlns:a16="http://schemas.microsoft.com/office/drawing/2014/main" xmlns="" id="{26DEEC72-8EDE-478B-AB25-FB5720BF378C}"/>
               </a:ext>
             </a:extLst>
           </p:cNvPr>
@@ -7150,6 +7177,10 @@
             <a:r>
               <a:rPr lang="en-US" altLang="ko-KR" i="1" u="sng" dirty="0"/>
               <a:t>[Predicting the target feature]</a:t>
+            </a:r>
+            <a:r>
+              <a:rPr lang="en-US" altLang="ko-KR" i="1" dirty="0"/>
+              <a:t/>
             </a:r>
             <a:br>
               <a:rPr lang="en-US" altLang="ko-KR" i="1" dirty="0"/>
@@ -7202,7 +7233,7 @@
           <p:cNvPr id="4" name="슬라이드 번호 개체 틀 3">
             <a:extLst>
               <a:ext uri="{FF2B5EF4-FFF2-40B4-BE49-F238E27FC236}">
-                <a16:creationId xmlns:a16="http://schemas.microsoft.com/office/drawing/2014/main" id="{B4C9DC4B-A391-4D26-9F5B-386226DDBC63}"/>
+                <a16:creationId xmlns:a16="http://schemas.microsoft.com/office/drawing/2014/main" xmlns="" id="{B4C9DC4B-A391-4D26-9F5B-386226DDBC63}"/>
               </a:ext>
             </a:extLst>
           </p:cNvPr>
@@ -7231,7 +7262,7 @@
           <p:cNvPr id="20" name="그룹 19">
             <a:extLst>
               <a:ext uri="{FF2B5EF4-FFF2-40B4-BE49-F238E27FC236}">
-                <a16:creationId xmlns:a16="http://schemas.microsoft.com/office/drawing/2014/main" id="{601797BF-0763-4C31-BA42-A92D7ABAC05D}"/>
+                <a16:creationId xmlns:a16="http://schemas.microsoft.com/office/drawing/2014/main" xmlns="" id="{601797BF-0763-4C31-BA42-A92D7ABAC05D}"/>
               </a:ext>
             </a:extLst>
           </p:cNvPr>
@@ -7253,7 +7284,7 @@
             <p:cNvPr id="21" name="직사각형 20">
               <a:extLst>
                 <a:ext uri="{FF2B5EF4-FFF2-40B4-BE49-F238E27FC236}">
-                  <a16:creationId xmlns:a16="http://schemas.microsoft.com/office/drawing/2014/main" id="{9BFFF50C-B954-45B1-98FE-E9488AB2026A}"/>
+                  <a16:creationId xmlns:a16="http://schemas.microsoft.com/office/drawing/2014/main" xmlns="" id="{9BFFF50C-B954-45B1-98FE-E9488AB2026A}"/>
                 </a:ext>
               </a:extLst>
             </p:cNvPr>
@@ -7306,7 +7337,7 @@
             <p:cNvPr id="22" name="직사각형 21">
               <a:extLst>
                 <a:ext uri="{FF2B5EF4-FFF2-40B4-BE49-F238E27FC236}">
-                  <a16:creationId xmlns:a16="http://schemas.microsoft.com/office/drawing/2014/main" id="{FDC25172-2EB1-48BF-BCBC-25B41402055E}"/>
+                  <a16:creationId xmlns:a16="http://schemas.microsoft.com/office/drawing/2014/main" xmlns="" id="{FDC25172-2EB1-48BF-BCBC-25B41402055E}"/>
                 </a:ext>
               </a:extLst>
             </p:cNvPr>
@@ -7359,7 +7390,7 @@
             <p:cNvPr id="23" name="왼쪽 중괄호 22">
               <a:extLst>
                 <a:ext uri="{FF2B5EF4-FFF2-40B4-BE49-F238E27FC236}">
-                  <a16:creationId xmlns:a16="http://schemas.microsoft.com/office/drawing/2014/main" id="{76ADE8FD-9DBC-49AE-A935-672B18EBB569}"/>
+                  <a16:creationId xmlns:a16="http://schemas.microsoft.com/office/drawing/2014/main" xmlns="" id="{76ADE8FD-9DBC-49AE-A935-672B18EBB569}"/>
                 </a:ext>
               </a:extLst>
             </p:cNvPr>
@@ -7403,7 +7434,7 @@
             <p:cNvPr id="24" name="TextBox 23">
               <a:extLst>
                 <a:ext uri="{FF2B5EF4-FFF2-40B4-BE49-F238E27FC236}">
-                  <a16:creationId xmlns:a16="http://schemas.microsoft.com/office/drawing/2014/main" id="{28C6CB20-70F2-492F-BB1F-75AB8EE70899}"/>
+                  <a16:creationId xmlns:a16="http://schemas.microsoft.com/office/drawing/2014/main" xmlns="" id="{28C6CB20-70F2-492F-BB1F-75AB8EE70899}"/>
                 </a:ext>
               </a:extLst>
             </p:cNvPr>
@@ -7442,14 +7473,14 @@
             </a:p>
           </p:txBody>
         </p:sp>
-        <mc:AlternateContent xmlns:mc="http://schemas.openxmlformats.org/markup-compatibility/2006">
-          <mc:Choice xmlns:a14="http://schemas.microsoft.com/office/drawing/2010/main" Requires="a14">
+        <mc:AlternateContent xmlns:mc="http://schemas.openxmlformats.org/markup-compatibility/2006" xmlns:a14="http://schemas.microsoft.com/office/drawing/2010/main">
+          <mc:Choice Requires="a14">
             <p:sp>
               <p:nvSpPr>
                 <p:cNvPr id="25" name="직사각형 24">
                   <a:extLst>
                     <a:ext uri="{FF2B5EF4-FFF2-40B4-BE49-F238E27FC236}">
-                      <a16:creationId xmlns:a16="http://schemas.microsoft.com/office/drawing/2014/main" id="{E1F7A810-5B59-464A-B1F4-701CD503967B}"/>
+                      <a16:creationId xmlns:a16="http://schemas.microsoft.com/office/drawing/2014/main" xmlns="" id="{E1F7A810-5B59-464A-B1F4-701CD503967B}"/>
                     </a:ext>
                   </a:extLst>
                 </p:cNvPr>
@@ -7499,7 +7530,7 @@
                           <m:sSubPr>
                             <m:ctrlPr>
                               <a:rPr lang="en-US" altLang="ko-KR" sz="4000" b="0" i="1" smtClean="0">
-                                <a:latin typeface="Cambria Math" panose="02040503050406030204" pitchFamily="18" charset="0"/>
+                                <a:latin typeface="Cambria Math" charset="0"/>
                               </a:rPr>
                             </m:ctrlPr>
                           </m:sSubPr>
@@ -7528,7 +7559,7 @@
               </p:txBody>
             </p:sp>
           </mc:Choice>
-          <mc:Fallback>
+          <mc:Fallback xmlns="">
             <p:sp>
               <p:nvSpPr>
                 <p:cNvPr id="25" name="직사각형 24">
@@ -7578,7 +7609,7 @@
             <p:cNvPr id="26" name="직사각형 25">
               <a:extLst>
                 <a:ext uri="{FF2B5EF4-FFF2-40B4-BE49-F238E27FC236}">
-                  <a16:creationId xmlns:a16="http://schemas.microsoft.com/office/drawing/2014/main" id="{B51A7A2C-9E09-4E84-93C0-4CB7294CE94C}"/>
+                  <a16:creationId xmlns:a16="http://schemas.microsoft.com/office/drawing/2014/main" xmlns="" id="{B51A7A2C-9E09-4E84-93C0-4CB7294CE94C}"/>
                 </a:ext>
               </a:extLst>
             </p:cNvPr>
@@ -7637,7 +7668,7 @@
             <p:cNvPr id="27" name="왼쪽 중괄호 26">
               <a:extLst>
                 <a:ext uri="{FF2B5EF4-FFF2-40B4-BE49-F238E27FC236}">
-                  <a16:creationId xmlns:a16="http://schemas.microsoft.com/office/drawing/2014/main" id="{618B5A2E-8BB6-4A4C-BD99-3D19FB865C29}"/>
+                  <a16:creationId xmlns:a16="http://schemas.microsoft.com/office/drawing/2014/main" xmlns="" id="{618B5A2E-8BB6-4A4C-BD99-3D19FB865C29}"/>
                 </a:ext>
               </a:extLst>
             </p:cNvPr>
@@ -7681,7 +7712,7 @@
             <p:cNvPr id="28" name="TextBox 27">
               <a:extLst>
                 <a:ext uri="{FF2B5EF4-FFF2-40B4-BE49-F238E27FC236}">
-                  <a16:creationId xmlns:a16="http://schemas.microsoft.com/office/drawing/2014/main" id="{35998252-0AC4-4130-B150-5F4AB2552315}"/>
+                  <a16:creationId xmlns:a16="http://schemas.microsoft.com/office/drawing/2014/main" xmlns="" id="{35998252-0AC4-4130-B150-5F4AB2552315}"/>
                 </a:ext>
               </a:extLst>
             </p:cNvPr>
@@ -7725,7 +7756,7 @@
             <p:cNvPr id="29" name="오른쪽 화살표 15">
               <a:extLst>
                 <a:ext uri="{FF2B5EF4-FFF2-40B4-BE49-F238E27FC236}">
-                  <a16:creationId xmlns:a16="http://schemas.microsoft.com/office/drawing/2014/main" id="{297B7AAC-CD2D-49EB-85BD-22060FE53507}"/>
+                  <a16:creationId xmlns:a16="http://schemas.microsoft.com/office/drawing/2014/main" xmlns="" id="{297B7AAC-CD2D-49EB-85BD-22060FE53507}"/>
                 </a:ext>
               </a:extLst>
             </p:cNvPr>
@@ -7769,7 +7800,7 @@
             <p:cNvPr id="30" name="모서리가 둥근 직사각형 16">
               <a:extLst>
                 <a:ext uri="{FF2B5EF4-FFF2-40B4-BE49-F238E27FC236}">
-                  <a16:creationId xmlns:a16="http://schemas.microsoft.com/office/drawing/2014/main" id="{23DAD145-2766-4B80-9C4E-C883754F3604}"/>
+                  <a16:creationId xmlns:a16="http://schemas.microsoft.com/office/drawing/2014/main" xmlns="" id="{23DAD145-2766-4B80-9C4E-C883754F3604}"/>
                 </a:ext>
               </a:extLst>
             </p:cNvPr>
@@ -7819,7 +7850,7 @@
             <p:cNvPr id="31" name="TextBox 30">
               <a:extLst>
                 <a:ext uri="{FF2B5EF4-FFF2-40B4-BE49-F238E27FC236}">
-                  <a16:creationId xmlns:a16="http://schemas.microsoft.com/office/drawing/2014/main" id="{47335CA9-ACFD-4B2D-9CE0-219F22F5D7DA}"/>
+                  <a16:creationId xmlns:a16="http://schemas.microsoft.com/office/drawing/2014/main" xmlns="" id="{47335CA9-ACFD-4B2D-9CE0-219F22F5D7DA}"/>
                 </a:ext>
               </a:extLst>
             </p:cNvPr>
@@ -7863,7 +7894,7 @@
             <p:cNvPr id="32" name="직선 화살표 연결선 31">
               <a:extLst>
                 <a:ext uri="{FF2B5EF4-FFF2-40B4-BE49-F238E27FC236}">
-                  <a16:creationId xmlns:a16="http://schemas.microsoft.com/office/drawing/2014/main" id="{092F5E1A-873F-4C88-9D21-35F20CD775B5}"/>
+                  <a16:creationId xmlns:a16="http://schemas.microsoft.com/office/drawing/2014/main" xmlns="" id="{092F5E1A-873F-4C88-9D21-35F20CD775B5}"/>
                 </a:ext>
               </a:extLst>
             </p:cNvPr>
@@ -7905,7 +7936,7 @@
             <p:cNvPr id="33" name="TextBox 32">
               <a:extLst>
                 <a:ext uri="{FF2B5EF4-FFF2-40B4-BE49-F238E27FC236}">
-                  <a16:creationId xmlns:a16="http://schemas.microsoft.com/office/drawing/2014/main" id="{94C0C461-E5A0-42F8-9463-CA179CE37994}"/>
+                  <a16:creationId xmlns:a16="http://schemas.microsoft.com/office/drawing/2014/main" xmlns="" id="{94C0C461-E5A0-42F8-9463-CA179CE37994}"/>
                 </a:ext>
               </a:extLst>
             </p:cNvPr>
@@ -7960,14 +7991,14 @@
             </a:p>
           </p:txBody>
         </p:sp>
-        <mc:AlternateContent xmlns:mc="http://schemas.openxmlformats.org/markup-compatibility/2006">
-          <mc:Choice xmlns:a14="http://schemas.microsoft.com/office/drawing/2010/main" Requires="a14">
+        <mc:AlternateContent xmlns:mc="http://schemas.openxmlformats.org/markup-compatibility/2006" xmlns:a14="http://schemas.microsoft.com/office/drawing/2010/main">
+          <mc:Choice Requires="a14">
             <p:sp>
               <p:nvSpPr>
                 <p:cNvPr id="34" name="직사각형 33">
                   <a:extLst>
                     <a:ext uri="{FF2B5EF4-FFF2-40B4-BE49-F238E27FC236}">
-                      <a16:creationId xmlns:a16="http://schemas.microsoft.com/office/drawing/2014/main" id="{6C5EA7F2-52B3-4105-9276-4AE70B7D3A1B}"/>
+                      <a16:creationId xmlns:a16="http://schemas.microsoft.com/office/drawing/2014/main" xmlns="" id="{6C5EA7F2-52B3-4105-9276-4AE70B7D3A1B}"/>
                     </a:ext>
                   </a:extLst>
                 </p:cNvPr>
@@ -8025,7 +8056,7 @@
                                 <a:solidFill>
                                   <a:schemeClr val="tx1"/>
                                 </a:solidFill>
-                                <a:latin typeface="Cambria Math" panose="02040503050406030204" pitchFamily="18" charset="0"/>
+                                <a:latin typeface="Cambria Math" charset="0"/>
                               </a:rPr>
                             </m:ctrlPr>
                           </m:accPr>
@@ -8056,7 +8087,7 @@
               </p:txBody>
             </p:sp>
           </mc:Choice>
-          <mc:Fallback>
+          <mc:Fallback xmlns="">
             <p:sp>
               <p:nvSpPr>
                 <p:cNvPr id="34" name="직사각형 33">
@@ -8230,7 +8261,7 @@
           <p:cNvPr id="1026" name="Picture 2" descr="scikit-learn logo">
             <a:extLst>
               <a:ext uri="{FF2B5EF4-FFF2-40B4-BE49-F238E27FC236}">
-                <a16:creationId xmlns:a16="http://schemas.microsoft.com/office/drawing/2014/main" id="{AEA450E6-1A52-47B2-9198-E9C1D0E7D775}"/>
+                <a16:creationId xmlns:a16="http://schemas.microsoft.com/office/drawing/2014/main" xmlns="" id="{AEA450E6-1A52-47B2-9198-E9C1D0E7D775}"/>
               </a:ext>
             </a:extLst>
           </p:cNvPr>
@@ -8307,7 +8338,7 @@
           <p:cNvPr id="2" name="제목 1">
             <a:extLst>
               <a:ext uri="{FF2B5EF4-FFF2-40B4-BE49-F238E27FC236}">
-                <a16:creationId xmlns:a16="http://schemas.microsoft.com/office/drawing/2014/main" id="{AA4CB50F-2845-4BCF-A3B0-E9EE064F8AC3}"/>
+                <a16:creationId xmlns:a16="http://schemas.microsoft.com/office/drawing/2014/main" xmlns="" id="{AA4CB50F-2845-4BCF-A3B0-E9EE064F8AC3}"/>
               </a:ext>
             </a:extLst>
           </p:cNvPr>
@@ -8336,7 +8367,7 @@
           <p:cNvPr id="4" name="슬라이드 번호 개체 틀 3">
             <a:extLst>
               <a:ext uri="{FF2B5EF4-FFF2-40B4-BE49-F238E27FC236}">
-                <a16:creationId xmlns:a16="http://schemas.microsoft.com/office/drawing/2014/main" id="{3109443D-3FFC-4C34-B7A2-0CA93BF24A59}"/>
+                <a16:creationId xmlns:a16="http://schemas.microsoft.com/office/drawing/2014/main" xmlns="" id="{3109443D-3FFC-4C34-B7A2-0CA93BF24A59}"/>
               </a:ext>
             </a:extLst>
           </p:cNvPr>
@@ -8365,7 +8396,7 @@
           <p:cNvPr id="5" name="그림 4">
             <a:extLst>
               <a:ext uri="{FF2B5EF4-FFF2-40B4-BE49-F238E27FC236}">
-                <a16:creationId xmlns:a16="http://schemas.microsoft.com/office/drawing/2014/main" id="{6CC17FB1-5B6E-414E-954C-B680F7179861}"/>
+                <a16:creationId xmlns:a16="http://schemas.microsoft.com/office/drawing/2014/main" xmlns="" id="{6CC17FB1-5B6E-414E-954C-B680F7179861}"/>
               </a:ext>
             </a:extLst>
           </p:cNvPr>
@@ -8394,7 +8425,7 @@
           <p:cNvPr id="6" name="직사각형 5">
             <a:extLst>
               <a:ext uri="{FF2B5EF4-FFF2-40B4-BE49-F238E27FC236}">
-                <a16:creationId xmlns:a16="http://schemas.microsoft.com/office/drawing/2014/main" id="{91EF604D-597A-4614-9669-3909DD187B90}"/>
+                <a16:creationId xmlns:a16="http://schemas.microsoft.com/office/drawing/2014/main" xmlns="" id="{91EF604D-597A-4614-9669-3909DD187B90}"/>
               </a:ext>
             </a:extLst>
           </p:cNvPr>
@@ -8446,7 +8477,7 @@
           <p:cNvPr id="7" name="직사각형 6">
             <a:extLst>
               <a:ext uri="{FF2B5EF4-FFF2-40B4-BE49-F238E27FC236}">
-                <a16:creationId xmlns:a16="http://schemas.microsoft.com/office/drawing/2014/main" id="{6ACEF97D-C927-440C-ADD8-16902AAAF5C8}"/>
+                <a16:creationId xmlns:a16="http://schemas.microsoft.com/office/drawing/2014/main" xmlns="" id="{6ACEF97D-C927-440C-ADD8-16902AAAF5C8}"/>
               </a:ext>
             </a:extLst>
           </p:cNvPr>
@@ -8498,7 +8529,7 @@
           <p:cNvPr id="8" name="직사각형 7">
             <a:extLst>
               <a:ext uri="{FF2B5EF4-FFF2-40B4-BE49-F238E27FC236}">
-                <a16:creationId xmlns:a16="http://schemas.microsoft.com/office/drawing/2014/main" id="{6D386D46-E657-43BC-B6AA-D87901B376CD}"/>
+                <a16:creationId xmlns:a16="http://schemas.microsoft.com/office/drawing/2014/main" xmlns="" id="{6D386D46-E657-43BC-B6AA-D87901B376CD}"/>
               </a:ext>
             </a:extLst>
           </p:cNvPr>
@@ -8550,7 +8581,7 @@
           <p:cNvPr id="9" name="직사각형 8">
             <a:extLst>
               <a:ext uri="{FF2B5EF4-FFF2-40B4-BE49-F238E27FC236}">
-                <a16:creationId xmlns:a16="http://schemas.microsoft.com/office/drawing/2014/main" id="{9A947224-8B92-4332-BA16-E356CF5D63C0}"/>
+                <a16:creationId xmlns:a16="http://schemas.microsoft.com/office/drawing/2014/main" xmlns="" id="{9A947224-8B92-4332-BA16-E356CF5D63C0}"/>
               </a:ext>
             </a:extLst>
           </p:cNvPr>
@@ -8602,7 +8633,7 @@
           <p:cNvPr id="10" name="직사각형 9">
             <a:extLst>
               <a:ext uri="{FF2B5EF4-FFF2-40B4-BE49-F238E27FC236}">
-                <a16:creationId xmlns:a16="http://schemas.microsoft.com/office/drawing/2014/main" id="{6B96930A-DE57-4D64-B33C-62B64FCC168A}"/>
+                <a16:creationId xmlns:a16="http://schemas.microsoft.com/office/drawing/2014/main" xmlns="" id="{6B96930A-DE57-4D64-B33C-62B64FCC168A}"/>
               </a:ext>
             </a:extLst>
           </p:cNvPr>
@@ -8654,7 +8685,7 @@
           <p:cNvPr id="11" name="직사각형 10">
             <a:extLst>
               <a:ext uri="{FF2B5EF4-FFF2-40B4-BE49-F238E27FC236}">
-                <a16:creationId xmlns:a16="http://schemas.microsoft.com/office/drawing/2014/main" id="{C702B2FF-E6D1-4F40-94FC-068667E7BEE6}"/>
+                <a16:creationId xmlns:a16="http://schemas.microsoft.com/office/drawing/2014/main" xmlns="" id="{C702B2FF-E6D1-4F40-94FC-068667E7BEE6}"/>
               </a:ext>
             </a:extLst>
           </p:cNvPr>
@@ -8736,7 +8767,7 @@
           <p:cNvPr id="2" name="제목 1">
             <a:extLst>
               <a:ext uri="{FF2B5EF4-FFF2-40B4-BE49-F238E27FC236}">
-                <a16:creationId xmlns:a16="http://schemas.microsoft.com/office/drawing/2014/main" id="{D469E6C8-B321-44A3-99BA-211EB6553707}"/>
+                <a16:creationId xmlns:a16="http://schemas.microsoft.com/office/drawing/2014/main" xmlns="" id="{D469E6C8-B321-44A3-99BA-211EB6553707}"/>
               </a:ext>
             </a:extLst>
           </p:cNvPr>
@@ -8767,7 +8798,7 @@
           <p:cNvPr id="3" name="내용 개체 틀 2">
             <a:extLst>
               <a:ext uri="{FF2B5EF4-FFF2-40B4-BE49-F238E27FC236}">
-                <a16:creationId xmlns:a16="http://schemas.microsoft.com/office/drawing/2014/main" id="{8746A77B-2D97-4F2F-9CFA-B00468DB6023}"/>
+                <a16:creationId xmlns:a16="http://schemas.microsoft.com/office/drawing/2014/main" xmlns="" id="{8746A77B-2D97-4F2F-9CFA-B00468DB6023}"/>
               </a:ext>
             </a:extLst>
           </p:cNvPr>
@@ -8796,7 +8827,7 @@
           <p:cNvPr id="4" name="슬라이드 번호 개체 틀 3">
             <a:extLst>
               <a:ext uri="{FF2B5EF4-FFF2-40B4-BE49-F238E27FC236}">
-                <a16:creationId xmlns:a16="http://schemas.microsoft.com/office/drawing/2014/main" id="{8B2E4F88-45ED-4DC5-98E0-378D14B0D433}"/>
+                <a16:creationId xmlns:a16="http://schemas.microsoft.com/office/drawing/2014/main" xmlns="" id="{8B2E4F88-45ED-4DC5-98E0-378D14B0D433}"/>
               </a:ext>
             </a:extLst>
           </p:cNvPr>
@@ -8825,7 +8856,7 @@
           <p:cNvPr id="5" name="그림 4">
             <a:extLst>
               <a:ext uri="{FF2B5EF4-FFF2-40B4-BE49-F238E27FC236}">
-                <a16:creationId xmlns:a16="http://schemas.microsoft.com/office/drawing/2014/main" id="{4CBF9DD5-A352-4224-B729-18AB4B3CD183}"/>
+                <a16:creationId xmlns:a16="http://schemas.microsoft.com/office/drawing/2014/main" xmlns="" id="{4CBF9DD5-A352-4224-B729-18AB4B3CD183}"/>
               </a:ext>
             </a:extLst>
           </p:cNvPr>
@@ -8885,7 +8916,7 @@
           <p:cNvPr id="2" name="제목 1">
             <a:extLst>
               <a:ext uri="{FF2B5EF4-FFF2-40B4-BE49-F238E27FC236}">
-                <a16:creationId xmlns:a16="http://schemas.microsoft.com/office/drawing/2014/main" id="{93F143AC-373D-4D4D-A086-59EBE968E707}"/>
+                <a16:creationId xmlns:a16="http://schemas.microsoft.com/office/drawing/2014/main" xmlns="" id="{93F143AC-373D-4D4D-A086-59EBE968E707}"/>
               </a:ext>
             </a:extLst>
           </p:cNvPr>
@@ -8923,7 +8954,7 @@
           <p:cNvPr id="3" name="내용 개체 틀 2">
             <a:extLst>
               <a:ext uri="{FF2B5EF4-FFF2-40B4-BE49-F238E27FC236}">
-                <a16:creationId xmlns:a16="http://schemas.microsoft.com/office/drawing/2014/main" id="{3171224B-10CF-412B-B26A-1D7CB5F3FAB4}"/>
+                <a16:creationId xmlns:a16="http://schemas.microsoft.com/office/drawing/2014/main" xmlns="" id="{3171224B-10CF-412B-B26A-1D7CB5F3FAB4}"/>
               </a:ext>
             </a:extLst>
           </p:cNvPr>
@@ -8956,7 +8987,7 @@
           <p:cNvPr id="4" name="슬라이드 번호 개체 틀 3">
             <a:extLst>
               <a:ext uri="{FF2B5EF4-FFF2-40B4-BE49-F238E27FC236}">
-                <a16:creationId xmlns:a16="http://schemas.microsoft.com/office/drawing/2014/main" id="{A1FBDC60-38D4-416D-B98A-717E6B3C9B6E}"/>
+                <a16:creationId xmlns:a16="http://schemas.microsoft.com/office/drawing/2014/main" xmlns="" id="{A1FBDC60-38D4-416D-B98A-717E6B3C9B6E}"/>
               </a:ext>
             </a:extLst>
           </p:cNvPr>
@@ -8985,7 +9016,7 @@
           <p:cNvPr id="5" name="그림 4">
             <a:extLst>
               <a:ext uri="{FF2B5EF4-FFF2-40B4-BE49-F238E27FC236}">
-                <a16:creationId xmlns:a16="http://schemas.microsoft.com/office/drawing/2014/main" id="{687E3CC7-0B98-4167-AAF4-E6D477E84CE9}"/>
+                <a16:creationId xmlns:a16="http://schemas.microsoft.com/office/drawing/2014/main" xmlns="" id="{687E3CC7-0B98-4167-AAF4-E6D477E84CE9}"/>
               </a:ext>
             </a:extLst>
           </p:cNvPr>
@@ -9045,7 +9076,7 @@
           <p:cNvPr id="2" name="제목 1">
             <a:extLst>
               <a:ext uri="{FF2B5EF4-FFF2-40B4-BE49-F238E27FC236}">
-                <a16:creationId xmlns:a16="http://schemas.microsoft.com/office/drawing/2014/main" id="{DF3EC871-CD7D-4561-90FB-F1E8C81988C6}"/>
+                <a16:creationId xmlns:a16="http://schemas.microsoft.com/office/drawing/2014/main" xmlns="" id="{DF3EC871-CD7D-4561-90FB-F1E8C81988C6}"/>
               </a:ext>
             </a:extLst>
           </p:cNvPr>
@@ -9074,7 +9105,7 @@
           <p:cNvPr id="3" name="내용 개체 틀 2">
             <a:extLst>
               <a:ext uri="{FF2B5EF4-FFF2-40B4-BE49-F238E27FC236}">
-                <a16:creationId xmlns:a16="http://schemas.microsoft.com/office/drawing/2014/main" id="{3BC045A9-4596-41CA-8C3C-4E747846051C}"/>
+                <a16:creationId xmlns:a16="http://schemas.microsoft.com/office/drawing/2014/main" xmlns="" id="{3BC045A9-4596-41CA-8C3C-4E747846051C}"/>
               </a:ext>
             </a:extLst>
           </p:cNvPr>
@@ -9103,7 +9134,7 @@
           <p:cNvPr id="4" name="슬라이드 번호 개체 틀 3">
             <a:extLst>
               <a:ext uri="{FF2B5EF4-FFF2-40B4-BE49-F238E27FC236}">
-                <a16:creationId xmlns:a16="http://schemas.microsoft.com/office/drawing/2014/main" id="{965B9F52-0E9E-4987-8E8A-FF965D28B07F}"/>
+                <a16:creationId xmlns:a16="http://schemas.microsoft.com/office/drawing/2014/main" xmlns="" id="{965B9F52-0E9E-4987-8E8A-FF965D28B07F}"/>
               </a:ext>
             </a:extLst>
           </p:cNvPr>
@@ -9132,7 +9163,7 @@
           <p:cNvPr id="6" name="그림 5">
             <a:extLst>
               <a:ext uri="{FF2B5EF4-FFF2-40B4-BE49-F238E27FC236}">
-                <a16:creationId xmlns:a16="http://schemas.microsoft.com/office/drawing/2014/main" id="{7CEB1B86-8764-4017-B000-25281FCEA8FA}"/>
+                <a16:creationId xmlns:a16="http://schemas.microsoft.com/office/drawing/2014/main" xmlns="" id="{7CEB1B86-8764-4017-B000-25281FCEA8FA}"/>
               </a:ext>
             </a:extLst>
           </p:cNvPr>
@@ -9192,7 +9223,7 @@
           <p:cNvPr id="2" name="제목 1">
             <a:extLst>
               <a:ext uri="{FF2B5EF4-FFF2-40B4-BE49-F238E27FC236}">
-                <a16:creationId xmlns:a16="http://schemas.microsoft.com/office/drawing/2014/main" id="{0EFDECE9-B29E-44B8-A428-9356ACBFEF25}"/>
+                <a16:creationId xmlns:a16="http://schemas.microsoft.com/office/drawing/2014/main" xmlns="" id="{0EFDECE9-B29E-44B8-A428-9356ACBFEF25}"/>
               </a:ext>
             </a:extLst>
           </p:cNvPr>
@@ -9229,7 +9260,7 @@
           <p:cNvPr id="3" name="내용 개체 틀 2">
             <a:extLst>
               <a:ext uri="{FF2B5EF4-FFF2-40B4-BE49-F238E27FC236}">
-                <a16:creationId xmlns:a16="http://schemas.microsoft.com/office/drawing/2014/main" id="{3A99B19C-D0BC-4AA9-8C16-2104D701AA3D}"/>
+                <a16:creationId xmlns:a16="http://schemas.microsoft.com/office/drawing/2014/main" xmlns="" id="{3A99B19C-D0BC-4AA9-8C16-2104D701AA3D}"/>
               </a:ext>
             </a:extLst>
           </p:cNvPr>
@@ -9383,7 +9414,7 @@
           <p:cNvPr id="4" name="슬라이드 번호 개체 틀 3">
             <a:extLst>
               <a:ext uri="{FF2B5EF4-FFF2-40B4-BE49-F238E27FC236}">
-                <a16:creationId xmlns:a16="http://schemas.microsoft.com/office/drawing/2014/main" id="{2E457EAA-AE1C-4C08-A92D-C36E4BC220CF}"/>
+                <a16:creationId xmlns:a16="http://schemas.microsoft.com/office/drawing/2014/main" xmlns="" id="{2E457EAA-AE1C-4C08-A92D-C36E4BC220CF}"/>
               </a:ext>
             </a:extLst>
           </p:cNvPr>
@@ -9412,7 +9443,7 @@
           <p:cNvPr id="2050" name="Picture 2" descr="뽑기 틀에 대한 이미지 검색결과">
             <a:extLst>
               <a:ext uri="{FF2B5EF4-FFF2-40B4-BE49-F238E27FC236}">
-                <a16:creationId xmlns:a16="http://schemas.microsoft.com/office/drawing/2014/main" id="{7CAD7E25-394C-4C53-AD97-0189CE7AF92D}"/>
+                <a16:creationId xmlns:a16="http://schemas.microsoft.com/office/drawing/2014/main" xmlns="" id="{7CAD7E25-394C-4C53-AD97-0189CE7AF92D}"/>
               </a:ext>
             </a:extLst>
           </p:cNvPr>
@@ -9459,7 +9490,7 @@
           <p:cNvPr id="2054" name="Picture 6" descr="뽑기에 대한 이미지 검색결과">
             <a:extLst>
               <a:ext uri="{FF2B5EF4-FFF2-40B4-BE49-F238E27FC236}">
-                <a16:creationId xmlns:a16="http://schemas.microsoft.com/office/drawing/2014/main" id="{69C087AF-C5CF-4216-AB06-FBFCD0CD99B3}"/>
+                <a16:creationId xmlns:a16="http://schemas.microsoft.com/office/drawing/2014/main" xmlns="" id="{69C087AF-C5CF-4216-AB06-FBFCD0CD99B3}"/>
               </a:ext>
             </a:extLst>
           </p:cNvPr>
@@ -9534,7 +9565,7 @@
           <p:cNvPr id="2" name="제목 1">
             <a:extLst>
               <a:ext uri="{FF2B5EF4-FFF2-40B4-BE49-F238E27FC236}">
-                <a16:creationId xmlns:a16="http://schemas.microsoft.com/office/drawing/2014/main" id="{3BD3574A-DA37-4694-8BF9-C2484BE7759F}"/>
+                <a16:creationId xmlns:a16="http://schemas.microsoft.com/office/drawing/2014/main" xmlns="" id="{3BD3574A-DA37-4694-8BF9-C2484BE7759F}"/>
               </a:ext>
             </a:extLst>
           </p:cNvPr>
@@ -9583,7 +9614,7 @@
           <p:cNvPr id="3" name="내용 개체 틀 2">
             <a:extLst>
               <a:ext uri="{FF2B5EF4-FFF2-40B4-BE49-F238E27FC236}">
-                <a16:creationId xmlns:a16="http://schemas.microsoft.com/office/drawing/2014/main" id="{625D53E6-E93A-4FC0-A7D7-CFF8C37410E5}"/>
+                <a16:creationId xmlns:a16="http://schemas.microsoft.com/office/drawing/2014/main" xmlns="" id="{625D53E6-E93A-4FC0-A7D7-CFF8C37410E5}"/>
               </a:ext>
             </a:extLst>
           </p:cNvPr>
@@ -9688,7 +9719,7 @@
           <p:cNvPr id="4" name="슬라이드 번호 개체 틀 3">
             <a:extLst>
               <a:ext uri="{FF2B5EF4-FFF2-40B4-BE49-F238E27FC236}">
-                <a16:creationId xmlns:a16="http://schemas.microsoft.com/office/drawing/2014/main" id="{9D984164-2087-49EF-B94B-AF3481784896}"/>
+                <a16:creationId xmlns:a16="http://schemas.microsoft.com/office/drawing/2014/main" xmlns="" id="{9D984164-2087-49EF-B94B-AF3481784896}"/>
               </a:ext>
             </a:extLst>
           </p:cNvPr>
@@ -9747,7 +9778,7 @@
           <p:cNvPr id="2" name="제목 1">
             <a:extLst>
               <a:ext uri="{FF2B5EF4-FFF2-40B4-BE49-F238E27FC236}">
-                <a16:creationId xmlns:a16="http://schemas.microsoft.com/office/drawing/2014/main" id="{E8A7292B-2277-48BD-8A67-EB238E1707B9}"/>
+                <a16:creationId xmlns:a16="http://schemas.microsoft.com/office/drawing/2014/main" xmlns="" id="{E8A7292B-2277-48BD-8A67-EB238E1707B9}"/>
               </a:ext>
             </a:extLst>
           </p:cNvPr>
@@ -9780,7 +9811,7 @@
           <p:cNvPr id="3" name="내용 개체 틀 2">
             <a:extLst>
               <a:ext uri="{FF2B5EF4-FFF2-40B4-BE49-F238E27FC236}">
-                <a16:creationId xmlns:a16="http://schemas.microsoft.com/office/drawing/2014/main" id="{339FFDD0-1599-4C5D-8332-234ECD9CC9C1}"/>
+                <a16:creationId xmlns:a16="http://schemas.microsoft.com/office/drawing/2014/main" xmlns="" id="{339FFDD0-1599-4C5D-8332-234ECD9CC9C1}"/>
               </a:ext>
             </a:extLst>
           </p:cNvPr>
@@ -9824,7 +9855,7 @@
           <p:cNvPr id="4" name="슬라이드 번호 개체 틀 3">
             <a:extLst>
               <a:ext uri="{FF2B5EF4-FFF2-40B4-BE49-F238E27FC236}">
-                <a16:creationId xmlns:a16="http://schemas.microsoft.com/office/drawing/2014/main" id="{54B9B4E5-BF2A-4132-9441-E0EF8FDDFD96}"/>
+                <a16:creationId xmlns:a16="http://schemas.microsoft.com/office/drawing/2014/main" xmlns="" id="{54B9B4E5-BF2A-4132-9441-E0EF8FDDFD96}"/>
               </a:ext>
             </a:extLst>
           </p:cNvPr>
@@ -9853,7 +9884,7 @@
           <p:cNvPr id="5" name="직사각형 4">
             <a:extLst>
               <a:ext uri="{FF2B5EF4-FFF2-40B4-BE49-F238E27FC236}">
-                <a16:creationId xmlns:a16="http://schemas.microsoft.com/office/drawing/2014/main" id="{EF94E00B-D727-4597-B599-2AD17603D3BC}"/>
+                <a16:creationId xmlns:a16="http://schemas.microsoft.com/office/drawing/2014/main" xmlns="" id="{EF94E00B-D727-4597-B599-2AD17603D3BC}"/>
               </a:ext>
             </a:extLst>
           </p:cNvPr>
@@ -9901,7 +9932,7 @@
           <p:cNvPr id="7" name="원통형 6">
             <a:extLst>
               <a:ext uri="{FF2B5EF4-FFF2-40B4-BE49-F238E27FC236}">
-                <a16:creationId xmlns:a16="http://schemas.microsoft.com/office/drawing/2014/main" id="{B6D24237-95CB-46DA-B881-8B61FDEE60DE}"/>
+                <a16:creationId xmlns:a16="http://schemas.microsoft.com/office/drawing/2014/main" xmlns="" id="{B6D24237-95CB-46DA-B881-8B61FDEE60DE}"/>
               </a:ext>
             </a:extLst>
           </p:cNvPr>
@@ -9949,7 +9980,7 @@
           <p:cNvPr id="9" name="직선 화살표 연결선 8">
             <a:extLst>
               <a:ext uri="{FF2B5EF4-FFF2-40B4-BE49-F238E27FC236}">
-                <a16:creationId xmlns:a16="http://schemas.microsoft.com/office/drawing/2014/main" id="{09A6D710-1565-43E7-91F2-B77EA7F491BF}"/>
+                <a16:creationId xmlns:a16="http://schemas.microsoft.com/office/drawing/2014/main" xmlns="" id="{09A6D710-1565-43E7-91F2-B77EA7F491BF}"/>
               </a:ext>
             </a:extLst>
           </p:cNvPr>
@@ -9994,7 +10025,7 @@
           <p:cNvPr id="10" name="직사각형 9">
             <a:extLst>
               <a:ext uri="{FF2B5EF4-FFF2-40B4-BE49-F238E27FC236}">
-                <a16:creationId xmlns:a16="http://schemas.microsoft.com/office/drawing/2014/main" id="{EA6A4008-4C68-4D9C-B57E-484D8AF8DF17}"/>
+                <a16:creationId xmlns:a16="http://schemas.microsoft.com/office/drawing/2014/main" xmlns="" id="{EA6A4008-4C68-4D9C-B57E-484D8AF8DF17}"/>
               </a:ext>
             </a:extLst>
           </p:cNvPr>
@@ -10057,7 +10088,7 @@
           <p:cNvPr id="11" name="직선 화살표 연결선 10">
             <a:extLst>
               <a:ext uri="{FF2B5EF4-FFF2-40B4-BE49-F238E27FC236}">
-                <a16:creationId xmlns:a16="http://schemas.microsoft.com/office/drawing/2014/main" id="{CA7C8894-4050-490D-BB06-4221D885DA0E}"/>
+                <a16:creationId xmlns:a16="http://schemas.microsoft.com/office/drawing/2014/main" xmlns="" id="{CA7C8894-4050-490D-BB06-4221D885DA0E}"/>
               </a:ext>
             </a:extLst>
           </p:cNvPr>

</xml_diff>